<commit_message>
After Addition during class
</commit_message>
<xml_diff>
--- a/doc/2D_CAD_PROGRAM_final.pptx
+++ b/doc/2D_CAD_PROGRAM_final.pptx
@@ -6638,6 +6638,50 @@
           </a:p>
         </p:txBody>
       </p:sp>
+      <p:sp>
+        <p:nvSpPr>
+          <p:cNvPr id="6" name="TextBox 5">
+            <a:extLst>
+              <a:ext uri="{FF2B5EF4-FFF2-40B4-BE49-F238E27FC236}">
+                <a16:creationId xmlns:a16="http://schemas.microsoft.com/office/drawing/2014/main" id="{5402F1F0-4C7B-0165-5828-29F7A32ED5C1}"/>
+              </a:ext>
+            </a:extLst>
+          </p:cNvPr>
+          <p:cNvSpPr txBox="1"/>
+          <p:nvPr/>
+        </p:nvSpPr>
+        <p:spPr>
+          <a:xfrm>
+            <a:off x="3394478" y="3666364"/>
+            <a:ext cx="3047267" cy="378097"/>
+          </a:xfrm>
+          <a:prstGeom prst="rect">
+            <a:avLst/>
+          </a:prstGeom>
+          <a:noFill/>
+        </p:spPr>
+        <p:txBody>
+          <a:bodyPr wrap="square">
+            <a:spAutoFit/>
+          </a:bodyPr>
+          <a:lstStyle/>
+          <a:p>
+            <a:r>
+              <a:rPr lang="en-US" sz="1800" dirty="0">
+                <a:solidFill>
+                  <a:schemeClr val="bg1"/>
+                </a:solidFill>
+              </a:rPr>
+              <a:t>TEAM IN</a:t>
+            </a:r>
+            <a:endParaRPr lang="en-US" dirty="0">
+              <a:solidFill>
+                <a:schemeClr val="bg1"/>
+              </a:solidFill>
+            </a:endParaRPr>
+          </a:p>
+        </p:txBody>
+      </p:sp>
     </p:spTree>
     <p:extLst>
       <p:ext uri="{BB962C8B-B14F-4D97-AF65-F5344CB8AC3E}">
@@ -8083,7 +8127,10 @@
           </a:bodyPr>
           <a:lstStyle/>
           <a:p>
-            <a:pPr algn="l"/>
+            <a:pPr marL="342900" indent="-342900" algn="l">
+              <a:buFont typeface="Wingdings" panose="05000000000000000000" pitchFamily="2" charset="2"/>
+              <a:buChar char="v"/>
+            </a:pPr>
             <a:endParaRPr lang="en-US" dirty="0"/>
           </a:p>
         </p:txBody>
@@ -8118,7 +8165,7 @@
         </p:blipFill>
         <p:spPr>
           <a:xfrm>
-            <a:off x="-8622" y="10"/>
+            <a:off x="0" y="10"/>
             <a:ext cx="6096000" cy="6857990"/>
           </a:xfrm>
           <a:prstGeom prst="rect">

</xml_diff>